<commit_message>
add 10, 11, 12, 13 tasks
</commit_message>
<xml_diff>
--- a/Python Урок 2 Базові операції.pptx
+++ b/Python Урок 2 Базові операції.pptx
@@ -273,7 +273,7 @@
           <a:p>
             <a:fld id="{D49534CC-852C-4801-A8F7-5A46FA280C68}" type="datetimeFigureOut">
               <a:rPr lang="uk-UA" smtClean="0"/>
-              <a:t>11.08.2024</a:t>
+              <a:t>18.09.2024</a:t>
             </a:fld>
             <a:endParaRPr lang="uk-UA"/>
           </a:p>
@@ -473,7 +473,7 @@
           <a:p>
             <a:fld id="{D49534CC-852C-4801-A8F7-5A46FA280C68}" type="datetimeFigureOut">
               <a:rPr lang="uk-UA" smtClean="0"/>
-              <a:t>11.08.2024</a:t>
+              <a:t>18.09.2024</a:t>
             </a:fld>
             <a:endParaRPr lang="uk-UA"/>
           </a:p>
@@ -683,7 +683,7 @@
           <a:p>
             <a:fld id="{D49534CC-852C-4801-A8F7-5A46FA280C68}" type="datetimeFigureOut">
               <a:rPr lang="uk-UA" smtClean="0"/>
-              <a:t>11.08.2024</a:t>
+              <a:t>18.09.2024</a:t>
             </a:fld>
             <a:endParaRPr lang="uk-UA"/>
           </a:p>
@@ -883,7 +883,7 @@
           <a:p>
             <a:fld id="{D49534CC-852C-4801-A8F7-5A46FA280C68}" type="datetimeFigureOut">
               <a:rPr lang="uk-UA" smtClean="0"/>
-              <a:t>11.08.2024</a:t>
+              <a:t>18.09.2024</a:t>
             </a:fld>
             <a:endParaRPr lang="uk-UA"/>
           </a:p>
@@ -1159,7 +1159,7 @@
           <a:p>
             <a:fld id="{D49534CC-852C-4801-A8F7-5A46FA280C68}" type="datetimeFigureOut">
               <a:rPr lang="uk-UA" smtClean="0"/>
-              <a:t>11.08.2024</a:t>
+              <a:t>18.09.2024</a:t>
             </a:fld>
             <a:endParaRPr lang="uk-UA"/>
           </a:p>
@@ -1427,7 +1427,7 @@
           <a:p>
             <a:fld id="{D49534CC-852C-4801-A8F7-5A46FA280C68}" type="datetimeFigureOut">
               <a:rPr lang="uk-UA" smtClean="0"/>
-              <a:t>11.08.2024</a:t>
+              <a:t>18.09.2024</a:t>
             </a:fld>
             <a:endParaRPr lang="uk-UA"/>
           </a:p>
@@ -1842,7 +1842,7 @@
           <a:p>
             <a:fld id="{D49534CC-852C-4801-A8F7-5A46FA280C68}" type="datetimeFigureOut">
               <a:rPr lang="uk-UA" smtClean="0"/>
-              <a:t>11.08.2024</a:t>
+              <a:t>18.09.2024</a:t>
             </a:fld>
             <a:endParaRPr lang="uk-UA"/>
           </a:p>
@@ -1984,7 +1984,7 @@
           <a:p>
             <a:fld id="{D49534CC-852C-4801-A8F7-5A46FA280C68}" type="datetimeFigureOut">
               <a:rPr lang="uk-UA" smtClean="0"/>
-              <a:t>11.08.2024</a:t>
+              <a:t>18.09.2024</a:t>
             </a:fld>
             <a:endParaRPr lang="uk-UA"/>
           </a:p>
@@ -2097,7 +2097,7 @@
           <a:p>
             <a:fld id="{D49534CC-852C-4801-A8F7-5A46FA280C68}" type="datetimeFigureOut">
               <a:rPr lang="uk-UA" smtClean="0"/>
-              <a:t>11.08.2024</a:t>
+              <a:t>18.09.2024</a:t>
             </a:fld>
             <a:endParaRPr lang="uk-UA"/>
           </a:p>
@@ -2410,7 +2410,7 @@
           <a:p>
             <a:fld id="{D49534CC-852C-4801-A8F7-5A46FA280C68}" type="datetimeFigureOut">
               <a:rPr lang="uk-UA" smtClean="0"/>
-              <a:t>11.08.2024</a:t>
+              <a:t>18.09.2024</a:t>
             </a:fld>
             <a:endParaRPr lang="uk-UA"/>
           </a:p>
@@ -2699,7 +2699,7 @@
           <a:p>
             <a:fld id="{D49534CC-852C-4801-A8F7-5A46FA280C68}" type="datetimeFigureOut">
               <a:rPr lang="uk-UA" smtClean="0"/>
-              <a:t>11.08.2024</a:t>
+              <a:t>18.09.2024</a:t>
             </a:fld>
             <a:endParaRPr lang="uk-UA"/>
           </a:p>
@@ -2942,7 +2942,7 @@
           <a:p>
             <a:fld id="{D49534CC-852C-4801-A8F7-5A46FA280C68}" type="datetimeFigureOut">
               <a:rPr lang="uk-UA" smtClean="0"/>
-              <a:t>11.08.2024</a:t>
+              <a:t>18.09.2024</a:t>
             </a:fld>
             <a:endParaRPr lang="uk-UA"/>
           </a:p>
@@ -4247,7 +4247,7 @@
                     <a:p>
                       <a:pPr algn="ctr"/>
                       <a:r>
-                        <a:rPr lang="es-ES" b="0" i="0">
+                        <a:rPr lang="es-ES" b="0" i="0" dirty="0">
                           <a:solidFill>
                             <a:srgbClr val="000000"/>
                           </a:solidFill>
@@ -4260,7 +4260,7 @@
                         <a:t>x </a:t>
                       </a:r>
                       <a:r>
-                        <a:rPr lang="es-ES" b="1" i="0">
+                        <a:rPr lang="es-ES" b="1" i="0" dirty="0">
                           <a:solidFill>
                             <a:srgbClr val="000000"/>
                           </a:solidFill>
@@ -4273,7 +4273,7 @@
                         <a:t>&amp;</a:t>
                       </a:r>
                       <a:r>
-                        <a:rPr lang="es-ES" b="0" i="0">
+                        <a:rPr lang="es-ES" b="0" i="0" dirty="0">
                           <a:solidFill>
                             <a:srgbClr val="000000"/>
                           </a:solidFill>
@@ -4319,7 +4319,7 @@
                     <a:p>
                       <a:pPr algn="ctr"/>
                       <a:r>
-                        <a:rPr lang="uk-UA" b="1" i="0">
+                        <a:rPr lang="uk-UA" b="1" i="0" dirty="0">
                           <a:solidFill>
                             <a:srgbClr val="000000"/>
                           </a:solidFill>
@@ -4331,7 +4331,7 @@
                         </a:rPr>
                         <a:t>|</a:t>
                       </a:r>
-                      <a:endParaRPr lang="uk-UA" b="0" i="0">
+                      <a:endParaRPr lang="uk-UA" b="0" i="0" dirty="0">
                         <a:solidFill>
                           <a:srgbClr val="000000"/>
                         </a:solidFill>

</xml_diff>